<commit_message>
New update from Petrus
</commit_message>
<xml_diff>
--- a/Hospital_Management_Project.pptx
+++ b/Hospital_Management_Project.pptx
@@ -3028,8 +3028,12 @@
               <a:t> </a:t>
             </a:r>
             <a:r>
+              <a:rPr lang="en-NZ" dirty="0" smtClean="0"/>
+              <a:t>– beta </a:t>
+            </a:r>
+            <a:r>
               <a:rPr lang="en-NZ" smtClean="0"/>
-              <a:t>- beta</a:t>
+              <a:t>- Petrus</a:t>
             </a:r>
             <a:endParaRPr lang="en-NZ" dirty="0"/>
           </a:p>

</xml_diff>